<commit_message>
Add jenkins installation step by step
</commit_message>
<xml_diff>
--- a/cdc_git_ws4.pptx
+++ b/cdc_git_ws4.pptx
@@ -5,7 +5,7 @@
     <p:sldMasterId id="2147483648" r:id="rId4"/>
   </p:sldMasterIdLst>
   <p:notesMasterIdLst>
-    <p:notesMasterId r:id="rId34"/>
+    <p:notesMasterId r:id="rId37"/>
   </p:notesMasterIdLst>
   <p:sldIdLst>
     <p:sldId id="302" r:id="rId5"/>
@@ -20,23 +20,26 @@
     <p:sldId id="335" r:id="rId14"/>
     <p:sldId id="337" r:id="rId15"/>
     <p:sldId id="303" r:id="rId16"/>
-    <p:sldId id="336" r:id="rId17"/>
-    <p:sldId id="304" r:id="rId18"/>
-    <p:sldId id="305" r:id="rId19"/>
-    <p:sldId id="306" r:id="rId20"/>
-    <p:sldId id="307" r:id="rId21"/>
-    <p:sldId id="308" r:id="rId22"/>
-    <p:sldId id="309" r:id="rId23"/>
-    <p:sldId id="310" r:id="rId24"/>
-    <p:sldId id="311" r:id="rId25"/>
-    <p:sldId id="312" r:id="rId26"/>
-    <p:sldId id="318" r:id="rId27"/>
-    <p:sldId id="317" r:id="rId28"/>
-    <p:sldId id="319" r:id="rId29"/>
-    <p:sldId id="320" r:id="rId30"/>
-    <p:sldId id="315" r:id="rId31"/>
-    <p:sldId id="316" r:id="rId32"/>
-    <p:sldId id="333" r:id="rId33"/>
+    <p:sldId id="354" r:id="rId17"/>
+    <p:sldId id="355" r:id="rId18"/>
+    <p:sldId id="356" r:id="rId19"/>
+    <p:sldId id="336" r:id="rId20"/>
+    <p:sldId id="304" r:id="rId21"/>
+    <p:sldId id="305" r:id="rId22"/>
+    <p:sldId id="306" r:id="rId23"/>
+    <p:sldId id="307" r:id="rId24"/>
+    <p:sldId id="308" r:id="rId25"/>
+    <p:sldId id="309" r:id="rId26"/>
+    <p:sldId id="310" r:id="rId27"/>
+    <p:sldId id="311" r:id="rId28"/>
+    <p:sldId id="312" r:id="rId29"/>
+    <p:sldId id="318" r:id="rId30"/>
+    <p:sldId id="317" r:id="rId31"/>
+    <p:sldId id="319" r:id="rId32"/>
+    <p:sldId id="320" r:id="rId33"/>
+    <p:sldId id="315" r:id="rId34"/>
+    <p:sldId id="316" r:id="rId35"/>
+    <p:sldId id="333" r:id="rId36"/>
   </p:sldIdLst>
   <p:sldSz cx="6858000" cy="5143500"/>
   <p:notesSz cx="6858000" cy="9144000"/>
@@ -12881,7 +12884,7 @@
           <a:p>
             <a:fld id="{7959948B-77FA-4B75-B65F-C5051F11C89F}" type="slidenum">
               <a:rPr lang="en-US" smtClean="0"/>
-              <a:t>19</a:t>
+              <a:t>22</a:t>
             </a:fld>
             <a:endParaRPr lang="en-US"/>
           </a:p>
@@ -15880,6 +15883,252 @@
           <a:bodyPr/>
           <a:lstStyle/>
           <a:p>
+            <a:endParaRPr lang="en-US"/>
+          </a:p>
+        </p:txBody>
+      </p:sp>
+      <p:pic>
+        <p:nvPicPr>
+          <p:cNvPr id="4" name="Content Placeholder 3"/>
+          <p:cNvPicPr>
+            <a:picLocks noGrp="1" noChangeAspect="1"/>
+          </p:cNvPicPr>
+          <p:nvPr>
+            <p:ph idx="1"/>
+          </p:nvPr>
+        </p:nvPicPr>
+        <p:blipFill>
+          <a:blip r:embed="rId2"/>
+          <a:stretch>
+            <a:fillRect/>
+          </a:stretch>
+        </p:blipFill>
+        <p:spPr>
+          <a:xfrm>
+            <a:off x="1148856" y="1047750"/>
+            <a:ext cx="4560288" cy="3429000"/>
+          </a:xfrm>
+          <a:prstGeom prst="rect">
+            <a:avLst/>
+          </a:prstGeom>
+        </p:spPr>
+      </p:pic>
+    </p:spTree>
+    <p:extLst>
+      <p:ext uri="{BB962C8B-B14F-4D97-AF65-F5344CB8AC3E}">
+        <p14:creationId xmlns:p14="http://schemas.microsoft.com/office/powerpoint/2010/main" val="1040608324"/>
+      </p:ext>
+    </p:extLst>
+  </p:cSld>
+  <p:clrMapOvr>
+    <a:masterClrMapping/>
+  </p:clrMapOvr>
+  <p:timing>
+    <p:tnLst>
+      <p:par>
+        <p:cTn id="1" dur="indefinite" restart="never" nodeType="tmRoot"/>
+      </p:par>
+    </p:tnLst>
+  </p:timing>
+</p:sld>
+</file>
+
+<file path=ppt/slides/slide14.xml><?xml version="1.0" encoding="utf-8"?>
+<p:sld xmlns:a="http://schemas.openxmlformats.org/drawingml/2006/main" xmlns:r="http://schemas.openxmlformats.org/officeDocument/2006/relationships" xmlns:p="http://schemas.openxmlformats.org/presentationml/2006/main">
+  <p:cSld>
+    <p:spTree>
+      <p:nvGrpSpPr>
+        <p:cNvPr id="1" name=""/>
+        <p:cNvGrpSpPr/>
+        <p:nvPr/>
+      </p:nvGrpSpPr>
+      <p:grpSpPr>
+        <a:xfrm>
+          <a:off x="0" y="0"/>
+          <a:ext cx="0" cy="0"/>
+          <a:chOff x="0" y="0"/>
+          <a:chExt cx="0" cy="0"/>
+        </a:xfrm>
+      </p:grpSpPr>
+      <p:sp>
+        <p:nvSpPr>
+          <p:cNvPr id="2" name="Title 1"/>
+          <p:cNvSpPr>
+            <a:spLocks noGrp="1"/>
+          </p:cNvSpPr>
+          <p:nvPr>
+            <p:ph type="title"/>
+          </p:nvPr>
+        </p:nvSpPr>
+        <p:spPr/>
+        <p:txBody>
+          <a:bodyPr/>
+          <a:lstStyle/>
+          <a:p>
+            <a:endParaRPr lang="en-US"/>
+          </a:p>
+        </p:txBody>
+      </p:sp>
+      <p:pic>
+        <p:nvPicPr>
+          <p:cNvPr id="4" name="Content Placeholder 3"/>
+          <p:cNvPicPr>
+            <a:picLocks noGrp="1" noChangeAspect="1"/>
+          </p:cNvPicPr>
+          <p:nvPr>
+            <p:ph idx="1"/>
+          </p:nvPr>
+        </p:nvPicPr>
+        <p:blipFill>
+          <a:blip r:embed="rId2"/>
+          <a:stretch>
+            <a:fillRect/>
+          </a:stretch>
+        </p:blipFill>
+        <p:spPr>
+          <a:xfrm>
+            <a:off x="796467" y="1047750"/>
+            <a:ext cx="5265066" cy="3429000"/>
+          </a:xfrm>
+          <a:prstGeom prst="rect">
+            <a:avLst/>
+          </a:prstGeom>
+        </p:spPr>
+      </p:pic>
+    </p:spTree>
+    <p:extLst>
+      <p:ext uri="{BB962C8B-B14F-4D97-AF65-F5344CB8AC3E}">
+        <p14:creationId xmlns:p14="http://schemas.microsoft.com/office/powerpoint/2010/main" val="3783368887"/>
+      </p:ext>
+    </p:extLst>
+  </p:cSld>
+  <p:clrMapOvr>
+    <a:masterClrMapping/>
+  </p:clrMapOvr>
+  <p:timing>
+    <p:tnLst>
+      <p:par>
+        <p:cTn id="1" dur="indefinite" restart="never" nodeType="tmRoot"/>
+      </p:par>
+    </p:tnLst>
+  </p:timing>
+</p:sld>
+</file>
+
+<file path=ppt/slides/slide15.xml><?xml version="1.0" encoding="utf-8"?>
+<p:sld xmlns:a="http://schemas.openxmlformats.org/drawingml/2006/main" xmlns:r="http://schemas.openxmlformats.org/officeDocument/2006/relationships" xmlns:p="http://schemas.openxmlformats.org/presentationml/2006/main">
+  <p:cSld>
+    <p:spTree>
+      <p:nvGrpSpPr>
+        <p:cNvPr id="1" name=""/>
+        <p:cNvGrpSpPr/>
+        <p:nvPr/>
+      </p:nvGrpSpPr>
+      <p:grpSpPr>
+        <a:xfrm>
+          <a:off x="0" y="0"/>
+          <a:ext cx="0" cy="0"/>
+          <a:chOff x="0" y="0"/>
+          <a:chExt cx="0" cy="0"/>
+        </a:xfrm>
+      </p:grpSpPr>
+      <p:sp>
+        <p:nvSpPr>
+          <p:cNvPr id="2" name="Title 1"/>
+          <p:cNvSpPr>
+            <a:spLocks noGrp="1"/>
+          </p:cNvSpPr>
+          <p:nvPr>
+            <p:ph type="title"/>
+          </p:nvPr>
+        </p:nvSpPr>
+        <p:spPr/>
+        <p:txBody>
+          <a:bodyPr/>
+          <a:lstStyle/>
+          <a:p>
+            <a:endParaRPr lang="en-US"/>
+          </a:p>
+        </p:txBody>
+      </p:sp>
+      <p:pic>
+        <p:nvPicPr>
+          <p:cNvPr id="4" name="Content Placeholder 3"/>
+          <p:cNvPicPr>
+            <a:picLocks noGrp="1" noChangeAspect="1"/>
+          </p:cNvPicPr>
+          <p:nvPr>
+            <p:ph idx="1"/>
+          </p:nvPr>
+        </p:nvPicPr>
+        <p:blipFill>
+          <a:blip r:embed="rId2"/>
+          <a:stretch>
+            <a:fillRect/>
+          </a:stretch>
+        </p:blipFill>
+        <p:spPr>
+          <a:xfrm>
+            <a:off x="1148784" y="1047750"/>
+            <a:ext cx="4560431" cy="3429000"/>
+          </a:xfrm>
+          <a:prstGeom prst="rect">
+            <a:avLst/>
+          </a:prstGeom>
+        </p:spPr>
+      </p:pic>
+    </p:spTree>
+    <p:extLst>
+      <p:ext uri="{BB962C8B-B14F-4D97-AF65-F5344CB8AC3E}">
+        <p14:creationId xmlns:p14="http://schemas.microsoft.com/office/powerpoint/2010/main" val="4272676209"/>
+      </p:ext>
+    </p:extLst>
+  </p:cSld>
+  <p:clrMapOvr>
+    <a:masterClrMapping/>
+  </p:clrMapOvr>
+  <p:timing>
+    <p:tnLst>
+      <p:par>
+        <p:cTn id="1" dur="indefinite" restart="never" nodeType="tmRoot"/>
+      </p:par>
+    </p:tnLst>
+  </p:timing>
+</p:sld>
+</file>
+
+<file path=ppt/slides/slide16.xml><?xml version="1.0" encoding="utf-8"?>
+<p:sld xmlns:a="http://schemas.openxmlformats.org/drawingml/2006/main" xmlns:r="http://schemas.openxmlformats.org/officeDocument/2006/relationships" xmlns:p="http://schemas.openxmlformats.org/presentationml/2006/main">
+  <p:cSld>
+    <p:spTree>
+      <p:nvGrpSpPr>
+        <p:cNvPr id="1" name=""/>
+        <p:cNvGrpSpPr/>
+        <p:nvPr/>
+      </p:nvGrpSpPr>
+      <p:grpSpPr>
+        <a:xfrm>
+          <a:off x="0" y="0"/>
+          <a:ext cx="0" cy="0"/>
+          <a:chOff x="0" y="0"/>
+          <a:chExt cx="0" cy="0"/>
+        </a:xfrm>
+      </p:grpSpPr>
+      <p:sp>
+        <p:nvSpPr>
+          <p:cNvPr id="2" name="Title 1"/>
+          <p:cNvSpPr>
+            <a:spLocks noGrp="1"/>
+          </p:cNvSpPr>
+          <p:nvPr>
+            <p:ph type="title"/>
+          </p:nvPr>
+        </p:nvSpPr>
+        <p:spPr/>
+        <p:txBody>
+          <a:bodyPr/>
+          <a:lstStyle/>
+          <a:p>
             <a:r>
               <a:rPr lang="en-US" dirty="0"/>
               <a:t>Jenkins Configuration</a:t>
@@ -16287,7 +16536,7 @@
 </p:sld>
 </file>
 
-<file path=ppt/slides/slide14.xml><?xml version="1.0" encoding="utf-8"?>
+<file path=ppt/slides/slide17.xml><?xml version="1.0" encoding="utf-8"?>
 <p:sld xmlns:a="http://schemas.openxmlformats.org/drawingml/2006/main" xmlns:r="http://schemas.openxmlformats.org/officeDocument/2006/relationships" xmlns:p="http://schemas.openxmlformats.org/presentationml/2006/main">
   <p:cSld>
     <p:spTree>
@@ -16479,7 +16728,7 @@
 </p:sld>
 </file>
 
-<file path=ppt/slides/slide15.xml><?xml version="1.0" encoding="utf-8"?>
+<file path=ppt/slides/slide18.xml><?xml version="1.0" encoding="utf-8"?>
 <p:sld xmlns:a="http://schemas.openxmlformats.org/drawingml/2006/main" xmlns:r="http://schemas.openxmlformats.org/officeDocument/2006/relationships" xmlns:p="http://schemas.openxmlformats.org/presentationml/2006/main">
   <p:cSld>
     <p:spTree>
@@ -16561,7 +16810,7 @@
 </p:sld>
 </file>
 
-<file path=ppt/slides/slide16.xml><?xml version="1.0" encoding="utf-8"?>
+<file path=ppt/slides/slide19.xml><?xml version="1.0" encoding="utf-8"?>
 <p:sld xmlns:a="http://schemas.openxmlformats.org/drawingml/2006/main" xmlns:r="http://schemas.openxmlformats.org/officeDocument/2006/relationships" xmlns:p="http://schemas.openxmlformats.org/presentationml/2006/main">
   <p:cSld>
     <p:spTree>
@@ -17099,7 +17348,137 @@
 </p:sld>
 </file>
 
-<file path=ppt/slides/slide17.xml><?xml version="1.0" encoding="utf-8"?>
+<file path=ppt/slides/slide2.xml><?xml version="1.0" encoding="utf-8"?>
+<p:sld xmlns:a="http://schemas.openxmlformats.org/drawingml/2006/main" xmlns:r="http://schemas.openxmlformats.org/officeDocument/2006/relationships" xmlns:p="http://schemas.openxmlformats.org/presentationml/2006/main">
+  <p:cSld>
+    <p:spTree>
+      <p:nvGrpSpPr>
+        <p:cNvPr id="1" name=""/>
+        <p:cNvGrpSpPr/>
+        <p:nvPr/>
+      </p:nvGrpSpPr>
+      <p:grpSpPr>
+        <a:xfrm>
+          <a:off x="0" y="0"/>
+          <a:ext cx="0" cy="0"/>
+          <a:chOff x="0" y="0"/>
+          <a:chExt cx="0" cy="0"/>
+        </a:xfrm>
+      </p:grpSpPr>
+      <p:sp>
+        <p:nvSpPr>
+          <p:cNvPr id="2" name="Title 1"/>
+          <p:cNvSpPr>
+            <a:spLocks noGrp="1"/>
+          </p:cNvSpPr>
+          <p:nvPr>
+            <p:ph type="title"/>
+          </p:nvPr>
+        </p:nvSpPr>
+        <p:spPr/>
+        <p:txBody>
+          <a:bodyPr/>
+          <a:lstStyle/>
+          <a:p>
+            <a:r>
+              <a:rPr lang="en-US" dirty="0" smtClean="0"/>
+              <a:t>Agenda</a:t>
+            </a:r>
+            <a:endParaRPr lang="en-US" dirty="0"/>
+          </a:p>
+        </p:txBody>
+      </p:sp>
+      <p:sp>
+        <p:nvSpPr>
+          <p:cNvPr id="3" name="Content Placeholder 2"/>
+          <p:cNvSpPr>
+            <a:spLocks noGrp="1"/>
+          </p:cNvSpPr>
+          <p:nvPr>
+            <p:ph idx="1"/>
+          </p:nvPr>
+        </p:nvSpPr>
+        <p:spPr/>
+        <p:txBody>
+          <a:bodyPr/>
+          <a:lstStyle/>
+          <a:p>
+            <a:r>
+              <a:rPr lang="en-US" dirty="0" smtClean="0"/>
+              <a:t>Overview of CI</a:t>
+            </a:r>
+          </a:p>
+          <a:p>
+            <a:r>
+              <a:rPr lang="en-US" dirty="0" smtClean="0"/>
+              <a:t>Jenkins Installation &amp; Configuration</a:t>
+            </a:r>
+          </a:p>
+          <a:p>
+            <a:r>
+              <a:rPr lang="en-US" dirty="0" smtClean="0"/>
+              <a:t>Simple Pipeline</a:t>
+            </a:r>
+          </a:p>
+          <a:p>
+            <a:r>
+              <a:rPr lang="en-US" dirty="0" smtClean="0"/>
+              <a:t>Integration with </a:t>
+            </a:r>
+            <a:r>
+              <a:rPr lang="en-US" dirty="0" err="1" smtClean="0"/>
+              <a:t>Git</a:t>
+            </a:r>
+            <a:endParaRPr lang="en-US" dirty="0" smtClean="0"/>
+          </a:p>
+          <a:p>
+            <a:r>
+              <a:rPr lang="en-US" dirty="0" smtClean="0"/>
+              <a:t>Integration with </a:t>
+            </a:r>
+            <a:r>
+              <a:rPr lang="en-US" dirty="0" smtClean="0"/>
+              <a:t>Maven</a:t>
+            </a:r>
+          </a:p>
+          <a:p>
+            <a:r>
+              <a:rPr lang="en-US" dirty="0" smtClean="0"/>
+              <a:t>Exercise</a:t>
+            </a:r>
+            <a:r>
+              <a:rPr lang="en-US" dirty="0" smtClean="0"/>
+              <a:t>: </a:t>
+            </a:r>
+            <a:r>
+              <a:rPr lang="en-US" dirty="0" smtClean="0"/>
+              <a:t>Create a simple pipeline</a:t>
+            </a:r>
+            <a:endParaRPr lang="en-US" dirty="0"/>
+          </a:p>
+        </p:txBody>
+      </p:sp>
+    </p:spTree>
+    <p:extLst>
+      <p:ext uri="{BB962C8B-B14F-4D97-AF65-F5344CB8AC3E}">
+        <p14:creationId xmlns:p14="http://schemas.microsoft.com/office/powerpoint/2010/main" val="1068121234"/>
+      </p:ext>
+    </p:extLst>
+  </p:cSld>
+  <p:clrMapOvr>
+    <a:masterClrMapping/>
+  </p:clrMapOvr>
+  <p:timing>
+    <p:tnLst>
+      <p:par>
+        <p:cTn id="1" dur="indefinite" restart="never" nodeType="tmRoot"/>
+      </p:par>
+    </p:tnLst>
+  </p:timing>
+</p:sld>
+</file>
+
+<file path=ppt/slides/slide20.xml><?xml version="1.0" encoding="utf-8"?>
 <p:sld xmlns:a="http://schemas.openxmlformats.org/drawingml/2006/main" xmlns:r="http://schemas.openxmlformats.org/officeDocument/2006/relationships" xmlns:p="http://schemas.openxmlformats.org/presentationml/2006/main">
   <p:cSld>
     <p:spTree>
@@ -17787,7 +18166,7 @@
 </p:sld>
 </file>
 
-<file path=ppt/slides/slide18.xml><?xml version="1.0" encoding="utf-8"?>
+<file path=ppt/slides/slide21.xml><?xml version="1.0" encoding="utf-8"?>
 <p:sld xmlns:a="http://schemas.openxmlformats.org/drawingml/2006/main" xmlns:r="http://schemas.openxmlformats.org/officeDocument/2006/relationships" xmlns:p="http://schemas.openxmlformats.org/presentationml/2006/main">
   <p:cSld>
     <p:spTree>
@@ -17876,7 +18255,7 @@
 </p:sld>
 </file>
 
-<file path=ppt/slides/slide19.xml><?xml version="1.0" encoding="utf-8"?>
+<file path=ppt/slides/slide22.xml><?xml version="1.0" encoding="utf-8"?>
 <p:sld xmlns:a="http://schemas.openxmlformats.org/drawingml/2006/main" xmlns:r="http://schemas.openxmlformats.org/officeDocument/2006/relationships" xmlns:p="http://schemas.openxmlformats.org/presentationml/2006/main">
   <p:cSld>
     <p:spTree>
@@ -18512,137 +18891,7 @@
 </p:sld>
 </file>
 
-<file path=ppt/slides/slide2.xml><?xml version="1.0" encoding="utf-8"?>
-<p:sld xmlns:a="http://schemas.openxmlformats.org/drawingml/2006/main" xmlns:r="http://schemas.openxmlformats.org/officeDocument/2006/relationships" xmlns:p="http://schemas.openxmlformats.org/presentationml/2006/main">
-  <p:cSld>
-    <p:spTree>
-      <p:nvGrpSpPr>
-        <p:cNvPr id="1" name=""/>
-        <p:cNvGrpSpPr/>
-        <p:nvPr/>
-      </p:nvGrpSpPr>
-      <p:grpSpPr>
-        <a:xfrm>
-          <a:off x="0" y="0"/>
-          <a:ext cx="0" cy="0"/>
-          <a:chOff x="0" y="0"/>
-          <a:chExt cx="0" cy="0"/>
-        </a:xfrm>
-      </p:grpSpPr>
-      <p:sp>
-        <p:nvSpPr>
-          <p:cNvPr id="2" name="Title 1"/>
-          <p:cNvSpPr>
-            <a:spLocks noGrp="1"/>
-          </p:cNvSpPr>
-          <p:nvPr>
-            <p:ph type="title"/>
-          </p:nvPr>
-        </p:nvSpPr>
-        <p:spPr/>
-        <p:txBody>
-          <a:bodyPr/>
-          <a:lstStyle/>
-          <a:p>
-            <a:r>
-              <a:rPr lang="en-US" dirty="0" smtClean="0"/>
-              <a:t>Agenda</a:t>
-            </a:r>
-            <a:endParaRPr lang="en-US" dirty="0"/>
-          </a:p>
-        </p:txBody>
-      </p:sp>
-      <p:sp>
-        <p:nvSpPr>
-          <p:cNvPr id="3" name="Content Placeholder 2"/>
-          <p:cNvSpPr>
-            <a:spLocks noGrp="1"/>
-          </p:cNvSpPr>
-          <p:nvPr>
-            <p:ph idx="1"/>
-          </p:nvPr>
-        </p:nvSpPr>
-        <p:spPr/>
-        <p:txBody>
-          <a:bodyPr/>
-          <a:lstStyle/>
-          <a:p>
-            <a:r>
-              <a:rPr lang="en-US" dirty="0" smtClean="0"/>
-              <a:t>Overview of CI</a:t>
-            </a:r>
-          </a:p>
-          <a:p>
-            <a:r>
-              <a:rPr lang="en-US" dirty="0" smtClean="0"/>
-              <a:t>Jenkins Installation &amp; Configuration</a:t>
-            </a:r>
-          </a:p>
-          <a:p>
-            <a:r>
-              <a:rPr lang="en-US" dirty="0" smtClean="0"/>
-              <a:t>Simple Pipeline</a:t>
-            </a:r>
-          </a:p>
-          <a:p>
-            <a:r>
-              <a:rPr lang="en-US" dirty="0" smtClean="0"/>
-              <a:t>Integration with </a:t>
-            </a:r>
-            <a:r>
-              <a:rPr lang="en-US" dirty="0" err="1" smtClean="0"/>
-              <a:t>Git</a:t>
-            </a:r>
-            <a:endParaRPr lang="en-US" dirty="0" smtClean="0"/>
-          </a:p>
-          <a:p>
-            <a:r>
-              <a:rPr lang="en-US" dirty="0" smtClean="0"/>
-              <a:t>Integration with </a:t>
-            </a:r>
-            <a:r>
-              <a:rPr lang="en-US" dirty="0" smtClean="0"/>
-              <a:t>Maven</a:t>
-            </a:r>
-          </a:p>
-          <a:p>
-            <a:r>
-              <a:rPr lang="en-US" dirty="0" smtClean="0"/>
-              <a:t>Exercise</a:t>
-            </a:r>
-            <a:r>
-              <a:rPr lang="en-US" dirty="0" smtClean="0"/>
-              <a:t>: </a:t>
-            </a:r>
-            <a:r>
-              <a:rPr lang="en-US" dirty="0" smtClean="0"/>
-              <a:t>Create a simple pipeline</a:t>
-            </a:r>
-            <a:endParaRPr lang="en-US" dirty="0"/>
-          </a:p>
-        </p:txBody>
-      </p:sp>
-    </p:spTree>
-    <p:extLst>
-      <p:ext uri="{BB962C8B-B14F-4D97-AF65-F5344CB8AC3E}">
-        <p14:creationId xmlns:p14="http://schemas.microsoft.com/office/powerpoint/2010/main" val="1068121234"/>
-      </p:ext>
-    </p:extLst>
-  </p:cSld>
-  <p:clrMapOvr>
-    <a:masterClrMapping/>
-  </p:clrMapOvr>
-  <p:timing>
-    <p:tnLst>
-      <p:par>
-        <p:cTn id="1" dur="indefinite" restart="never" nodeType="tmRoot"/>
-      </p:par>
-    </p:tnLst>
-  </p:timing>
-</p:sld>
-</file>
-
-<file path=ppt/slides/slide20.xml><?xml version="1.0" encoding="utf-8"?>
+<file path=ppt/slides/slide23.xml><?xml version="1.0" encoding="utf-8"?>
 <p:sld xmlns:a="http://schemas.openxmlformats.org/drawingml/2006/main" xmlns:r="http://schemas.openxmlformats.org/officeDocument/2006/relationships" xmlns:p="http://schemas.openxmlformats.org/presentationml/2006/main">
   <p:cSld>
     <p:spTree>
@@ -19188,7 +19437,7 @@
 </p:sld>
 </file>
 
-<file path=ppt/slides/slide21.xml><?xml version="1.0" encoding="utf-8"?>
+<file path=ppt/slides/slide24.xml><?xml version="1.0" encoding="utf-8"?>
 <p:sld xmlns:a="http://schemas.openxmlformats.org/drawingml/2006/main" xmlns:r="http://schemas.openxmlformats.org/officeDocument/2006/relationships" xmlns:p="http://schemas.openxmlformats.org/presentationml/2006/main">
   <p:cSld>
     <p:spTree>
@@ -19306,7 +19555,7 @@
 </p:sld>
 </file>
 
-<file path=ppt/slides/slide22.xml><?xml version="1.0" encoding="utf-8"?>
+<file path=ppt/slides/slide25.xml><?xml version="1.0" encoding="utf-8"?>
 <p:sld xmlns:a="http://schemas.openxmlformats.org/drawingml/2006/main" xmlns:r="http://schemas.openxmlformats.org/officeDocument/2006/relationships" xmlns:p="http://schemas.openxmlformats.org/presentationml/2006/main">
   <p:cSld>
     <p:spTree>
@@ -19423,7 +19672,7 @@
 </p:sld>
 </file>
 
-<file path=ppt/slides/slide23.xml><?xml version="1.0" encoding="utf-8"?>
+<file path=ppt/slides/slide26.xml><?xml version="1.0" encoding="utf-8"?>
 <p:sld xmlns:a="http://schemas.openxmlformats.org/drawingml/2006/main" xmlns:r="http://schemas.openxmlformats.org/officeDocument/2006/relationships" xmlns:p="http://schemas.openxmlformats.org/presentationml/2006/main">
   <p:cSld>
     <p:spTree>
@@ -19512,7 +19761,7 @@
 </p:sld>
 </file>
 
-<file path=ppt/slides/slide24.xml><?xml version="1.0" encoding="utf-8"?>
+<file path=ppt/slides/slide27.xml><?xml version="1.0" encoding="utf-8"?>
 <p:sld xmlns:a="http://schemas.openxmlformats.org/drawingml/2006/main" xmlns:r="http://schemas.openxmlformats.org/officeDocument/2006/relationships" xmlns:p="http://schemas.openxmlformats.org/presentationml/2006/main">
   <p:cSld>
     <p:spTree>
@@ -19942,7 +20191,7 @@
 </p:sld>
 </file>
 
-<file path=ppt/slides/slide25.xml><?xml version="1.0" encoding="utf-8"?>
+<file path=ppt/slides/slide28.xml><?xml version="1.0" encoding="utf-8"?>
 <p:sld xmlns:a="http://schemas.openxmlformats.org/drawingml/2006/main" xmlns:r="http://schemas.openxmlformats.org/officeDocument/2006/relationships" xmlns:p="http://schemas.openxmlformats.org/presentationml/2006/main">
   <p:cSld>
     <p:spTree>
@@ -20075,7 +20324,7 @@
 </p:sld>
 </file>
 
-<file path=ppt/slides/slide26.xml><?xml version="1.0" encoding="utf-8"?>
+<file path=ppt/slides/slide29.xml><?xml version="1.0" encoding="utf-8"?>
 <p:sld xmlns:a="http://schemas.openxmlformats.org/drawingml/2006/main" xmlns:r="http://schemas.openxmlformats.org/officeDocument/2006/relationships" xmlns:p="http://schemas.openxmlformats.org/presentationml/2006/main">
   <p:cSld>
     <p:spTree>
@@ -20208,7 +20457,123 @@
 </p:sld>
 </file>
 
-<file path=ppt/slides/slide27.xml><?xml version="1.0" encoding="utf-8"?>
+<file path=ppt/slides/slide3.xml><?xml version="1.0" encoding="utf-8"?>
+<p:sld xmlns:a="http://schemas.openxmlformats.org/drawingml/2006/main" xmlns:r="http://schemas.openxmlformats.org/officeDocument/2006/relationships" xmlns:p="http://schemas.openxmlformats.org/presentationml/2006/main">
+  <p:cSld>
+    <p:spTree>
+      <p:nvGrpSpPr>
+        <p:cNvPr id="1" name=""/>
+        <p:cNvGrpSpPr/>
+        <p:nvPr/>
+      </p:nvGrpSpPr>
+      <p:grpSpPr>
+        <a:xfrm>
+          <a:off x="0" y="0"/>
+          <a:ext cx="0" cy="0"/>
+          <a:chOff x="0" y="0"/>
+          <a:chExt cx="0" cy="0"/>
+        </a:xfrm>
+      </p:grpSpPr>
+      <p:sp>
+        <p:nvSpPr>
+          <p:cNvPr id="2" name="Title 1"/>
+          <p:cNvSpPr>
+            <a:spLocks noGrp="1"/>
+          </p:cNvSpPr>
+          <p:nvPr>
+            <p:ph type="title"/>
+          </p:nvPr>
+        </p:nvSpPr>
+        <p:spPr/>
+        <p:txBody>
+          <a:bodyPr/>
+          <a:lstStyle/>
+          <a:p>
+            <a:r>
+              <a:rPr lang="en-US" dirty="0" smtClean="0"/>
+              <a:t>Assumptions</a:t>
+            </a:r>
+            <a:endParaRPr lang="en-US" dirty="0"/>
+          </a:p>
+        </p:txBody>
+      </p:sp>
+      <p:sp>
+        <p:nvSpPr>
+          <p:cNvPr id="3" name="Content Placeholder 2"/>
+          <p:cNvSpPr>
+            <a:spLocks noGrp="1"/>
+          </p:cNvSpPr>
+          <p:nvPr>
+            <p:ph idx="1"/>
+          </p:nvPr>
+        </p:nvSpPr>
+        <p:spPr/>
+        <p:txBody>
+          <a:bodyPr/>
+          <a:lstStyle/>
+          <a:p>
+            <a:r>
+              <a:rPr lang="en-US" dirty="0" smtClean="0"/>
+              <a:t>Familiar with </a:t>
+            </a:r>
+            <a:r>
+              <a:rPr lang="en-US" dirty="0" err="1" smtClean="0"/>
+              <a:t>Github</a:t>
+            </a:r>
+            <a:endParaRPr lang="en-US" dirty="0" smtClean="0"/>
+          </a:p>
+          <a:p>
+            <a:r>
+              <a:rPr lang="en-US" dirty="0" smtClean="0"/>
+              <a:t>Familiar with Java Syntax</a:t>
+            </a:r>
+          </a:p>
+          <a:p>
+            <a:r>
+              <a:rPr lang="en-US" dirty="0" smtClean="0"/>
+              <a:t>Familiar with Maven</a:t>
+            </a:r>
+          </a:p>
+          <a:p>
+            <a:pPr lvl="1"/>
+            <a:r>
+              <a:rPr lang="en-US" dirty="0" smtClean="0"/>
+              <a:t>How to build a project</a:t>
+            </a:r>
+          </a:p>
+          <a:p>
+            <a:pPr lvl="1"/>
+            <a:r>
+              <a:rPr lang="en-US" dirty="0" smtClean="0"/>
+              <a:t>How to run unit testing</a:t>
+            </a:r>
+          </a:p>
+          <a:p>
+            <a:endParaRPr lang="en-US" dirty="0"/>
+          </a:p>
+        </p:txBody>
+      </p:sp>
+    </p:spTree>
+    <p:extLst>
+      <p:ext uri="{BB962C8B-B14F-4D97-AF65-F5344CB8AC3E}">
+        <p14:creationId xmlns:p14="http://schemas.microsoft.com/office/powerpoint/2010/main" val="192687140"/>
+      </p:ext>
+    </p:extLst>
+  </p:cSld>
+  <p:clrMapOvr>
+    <a:masterClrMapping/>
+  </p:clrMapOvr>
+  <p:timing>
+    <p:tnLst>
+      <p:par>
+        <p:cTn id="1" dur="indefinite" restart="never" nodeType="tmRoot"/>
+      </p:par>
+    </p:tnLst>
+  </p:timing>
+</p:sld>
+</file>
+
+<file path=ppt/slides/slide30.xml><?xml version="1.0" encoding="utf-8"?>
 <p:sld xmlns:a="http://schemas.openxmlformats.org/drawingml/2006/main" xmlns:r="http://schemas.openxmlformats.org/officeDocument/2006/relationships" xmlns:p="http://schemas.openxmlformats.org/presentationml/2006/main">
   <p:cSld>
     <p:spTree>
@@ -20436,7 +20801,7 @@
 </p:sld>
 </file>
 
-<file path=ppt/slides/slide28.xml><?xml version="1.0" encoding="utf-8"?>
+<file path=ppt/slides/slide31.xml><?xml version="1.0" encoding="utf-8"?>
 <p:sld xmlns:a="http://schemas.openxmlformats.org/drawingml/2006/main" xmlns:r="http://schemas.openxmlformats.org/officeDocument/2006/relationships" xmlns:p="http://schemas.openxmlformats.org/presentationml/2006/main">
   <p:cSld>
     <p:spTree>
@@ -20782,7 +21147,7 @@
 </p:sld>
 </file>
 
-<file path=ppt/slides/slide29.xml><?xml version="1.0" encoding="utf-8"?>
+<file path=ppt/slides/slide32.xml><?xml version="1.0" encoding="utf-8"?>
 <p:sld xmlns:a="http://schemas.openxmlformats.org/drawingml/2006/main" xmlns:r="http://schemas.openxmlformats.org/officeDocument/2006/relationships" xmlns:p="http://schemas.openxmlformats.org/presentationml/2006/main">
   <p:cSld>
     <p:spTree>
@@ -20855,122 +21220,6 @@
     <p:extLst>
       <p:ext uri="{BB962C8B-B14F-4D97-AF65-F5344CB8AC3E}">
         <p14:creationId xmlns:p14="http://schemas.microsoft.com/office/powerpoint/2010/main" val="3258676940"/>
-      </p:ext>
-    </p:extLst>
-  </p:cSld>
-  <p:clrMapOvr>
-    <a:masterClrMapping/>
-  </p:clrMapOvr>
-  <p:timing>
-    <p:tnLst>
-      <p:par>
-        <p:cTn id="1" dur="indefinite" restart="never" nodeType="tmRoot"/>
-      </p:par>
-    </p:tnLst>
-  </p:timing>
-</p:sld>
-</file>
-
-<file path=ppt/slides/slide3.xml><?xml version="1.0" encoding="utf-8"?>
-<p:sld xmlns:a="http://schemas.openxmlformats.org/drawingml/2006/main" xmlns:r="http://schemas.openxmlformats.org/officeDocument/2006/relationships" xmlns:p="http://schemas.openxmlformats.org/presentationml/2006/main">
-  <p:cSld>
-    <p:spTree>
-      <p:nvGrpSpPr>
-        <p:cNvPr id="1" name=""/>
-        <p:cNvGrpSpPr/>
-        <p:nvPr/>
-      </p:nvGrpSpPr>
-      <p:grpSpPr>
-        <a:xfrm>
-          <a:off x="0" y="0"/>
-          <a:ext cx="0" cy="0"/>
-          <a:chOff x="0" y="0"/>
-          <a:chExt cx="0" cy="0"/>
-        </a:xfrm>
-      </p:grpSpPr>
-      <p:sp>
-        <p:nvSpPr>
-          <p:cNvPr id="2" name="Title 1"/>
-          <p:cNvSpPr>
-            <a:spLocks noGrp="1"/>
-          </p:cNvSpPr>
-          <p:nvPr>
-            <p:ph type="title"/>
-          </p:nvPr>
-        </p:nvSpPr>
-        <p:spPr/>
-        <p:txBody>
-          <a:bodyPr/>
-          <a:lstStyle/>
-          <a:p>
-            <a:r>
-              <a:rPr lang="en-US" dirty="0" smtClean="0"/>
-              <a:t>Assumptions</a:t>
-            </a:r>
-            <a:endParaRPr lang="en-US" dirty="0"/>
-          </a:p>
-        </p:txBody>
-      </p:sp>
-      <p:sp>
-        <p:nvSpPr>
-          <p:cNvPr id="3" name="Content Placeholder 2"/>
-          <p:cNvSpPr>
-            <a:spLocks noGrp="1"/>
-          </p:cNvSpPr>
-          <p:nvPr>
-            <p:ph idx="1"/>
-          </p:nvPr>
-        </p:nvSpPr>
-        <p:spPr/>
-        <p:txBody>
-          <a:bodyPr/>
-          <a:lstStyle/>
-          <a:p>
-            <a:r>
-              <a:rPr lang="en-US" dirty="0" smtClean="0"/>
-              <a:t>Familiar with </a:t>
-            </a:r>
-            <a:r>
-              <a:rPr lang="en-US" dirty="0" err="1" smtClean="0"/>
-              <a:t>Github</a:t>
-            </a:r>
-            <a:endParaRPr lang="en-US" dirty="0" smtClean="0"/>
-          </a:p>
-          <a:p>
-            <a:r>
-              <a:rPr lang="en-US" dirty="0" smtClean="0"/>
-              <a:t>Familiar with Java Syntax</a:t>
-            </a:r>
-          </a:p>
-          <a:p>
-            <a:r>
-              <a:rPr lang="en-US" dirty="0" smtClean="0"/>
-              <a:t>Familiar with Maven</a:t>
-            </a:r>
-          </a:p>
-          <a:p>
-            <a:pPr lvl="1"/>
-            <a:r>
-              <a:rPr lang="en-US" dirty="0" smtClean="0"/>
-              <a:t>How to build a project</a:t>
-            </a:r>
-          </a:p>
-          <a:p>
-            <a:pPr lvl="1"/>
-            <a:r>
-              <a:rPr lang="en-US" dirty="0" smtClean="0"/>
-              <a:t>How to run unit testing</a:t>
-            </a:r>
-          </a:p>
-          <a:p>
-            <a:endParaRPr lang="en-US" dirty="0"/>
-          </a:p>
-        </p:txBody>
-      </p:sp>
-    </p:spTree>
-    <p:extLst>
-      <p:ext uri="{BB962C8B-B14F-4D97-AF65-F5344CB8AC3E}">
-        <p14:creationId xmlns:p14="http://schemas.microsoft.com/office/powerpoint/2010/main" val="192687140"/>
       </p:ext>
     </p:extLst>
   </p:cSld>

</xml_diff>